<commit_message>
revisado SPR8 U2 PR OB
</commit_message>
<xml_diff>
--- a/03_Analisis_de_Datos/Sprint_08/TITANIC.pptx
+++ b/03_Analisis_de_Datos/Sprint_08/TITANIC.pptx
@@ -12,7 +12,6 @@
     <p:sldId id="262" r:id="rId6"/>
     <p:sldId id="263" r:id="rId7"/>
     <p:sldId id="260" r:id="rId8"/>
-    <p:sldId id="264" r:id="rId9"/>
   </p:sldIdLst>
   <p:sldSz cx="9144000" cy="6858000" type="screen4x3"/>
   <p:notesSz cx="6858000" cy="9144000"/>
@@ -257,7 +256,8 @@
           <a:p>
             <a:fld id="{EE617D16-BEAA-46D6-AA45-927CEE853205}" type="datetimeFigureOut">
               <a:rPr lang="es-ES" smtClean="0"/>
-              <a:t>04/04/2024</a:t>
+              <a:pPr/>
+              <a:t>06/04/2024</a:t>
             </a:fld>
             <a:endParaRPr lang="es-ES"/>
           </a:p>
@@ -309,6 +309,7 @@
           <a:p>
             <a:fld id="{74D9C49B-0C95-4A37-A3B8-0BC88147E74A}" type="slidenum">
               <a:rPr lang="es-ES" smtClean="0"/>
+              <a:pPr/>
               <a:t>‹Nº›</a:t>
             </a:fld>
             <a:endParaRPr lang="es-ES"/>
@@ -616,7 +617,8 @@
           <a:p>
             <a:fld id="{EE617D16-BEAA-46D6-AA45-927CEE853205}" type="datetimeFigureOut">
               <a:rPr lang="es-ES" smtClean="0"/>
-              <a:t>04/04/2024</a:t>
+              <a:pPr/>
+              <a:t>06/04/2024</a:t>
             </a:fld>
             <a:endParaRPr lang="es-ES"/>
           </a:p>
@@ -658,6 +660,7 @@
           <a:p>
             <a:fld id="{74D9C49B-0C95-4A37-A3B8-0BC88147E74A}" type="slidenum">
               <a:rPr lang="es-ES" smtClean="0"/>
+              <a:pPr/>
               <a:t>‹Nº›</a:t>
             </a:fld>
             <a:endParaRPr lang="es-ES"/>
@@ -791,7 +794,8 @@
           <a:p>
             <a:fld id="{EE617D16-BEAA-46D6-AA45-927CEE853205}" type="datetimeFigureOut">
               <a:rPr lang="es-ES" smtClean="0"/>
-              <a:t>04/04/2024</a:t>
+              <a:pPr/>
+              <a:t>06/04/2024</a:t>
             </a:fld>
             <a:endParaRPr lang="es-ES"/>
           </a:p>
@@ -833,6 +837,7 @@
           <a:p>
             <a:fld id="{74D9C49B-0C95-4A37-A3B8-0BC88147E74A}" type="slidenum">
               <a:rPr lang="es-ES" smtClean="0"/>
+              <a:pPr/>
               <a:t>‹Nº›</a:t>
             </a:fld>
             <a:endParaRPr lang="es-ES"/>
@@ -1026,7 +1031,8 @@
           <a:p>
             <a:fld id="{EE617D16-BEAA-46D6-AA45-927CEE853205}" type="datetimeFigureOut">
               <a:rPr lang="es-ES" smtClean="0"/>
-              <a:t>04/04/2024</a:t>
+              <a:pPr/>
+              <a:t>06/04/2024</a:t>
             </a:fld>
             <a:endParaRPr lang="es-ES"/>
           </a:p>
@@ -1068,6 +1074,7 @@
           <a:p>
             <a:fld id="{74D9C49B-0C95-4A37-A3B8-0BC88147E74A}" type="slidenum">
               <a:rPr lang="es-ES" smtClean="0"/>
+              <a:pPr/>
               <a:t>‹Nº›</a:t>
             </a:fld>
             <a:endParaRPr lang="es-ES"/>
@@ -1295,7 +1302,8 @@
           <a:p>
             <a:fld id="{EE617D16-BEAA-46D6-AA45-927CEE853205}" type="datetimeFigureOut">
               <a:rPr lang="es-ES" smtClean="0"/>
-              <a:t>04/04/2024</a:t>
+              <a:pPr/>
+              <a:t>06/04/2024</a:t>
             </a:fld>
             <a:endParaRPr lang="es-ES"/>
           </a:p>
@@ -1347,6 +1355,7 @@
           <a:p>
             <a:fld id="{74D9C49B-0C95-4A37-A3B8-0BC88147E74A}" type="slidenum">
               <a:rPr lang="es-ES" smtClean="0"/>
+              <a:pPr/>
               <a:t>‹Nº›</a:t>
             </a:fld>
             <a:endParaRPr lang="es-ES"/>
@@ -1515,7 +1524,8 @@
           <a:p>
             <a:fld id="{EE617D16-BEAA-46D6-AA45-927CEE853205}" type="datetimeFigureOut">
               <a:rPr lang="es-ES" smtClean="0"/>
-              <a:t>04/04/2024</a:t>
+              <a:pPr/>
+              <a:t>06/04/2024</a:t>
             </a:fld>
             <a:endParaRPr lang="es-ES"/>
           </a:p>
@@ -1557,6 +1567,7 @@
           <a:p>
             <a:fld id="{74D9C49B-0C95-4A37-A3B8-0BC88147E74A}" type="slidenum">
               <a:rPr lang="es-ES" smtClean="0"/>
+              <a:pPr/>
               <a:t>‹Nº›</a:t>
             </a:fld>
             <a:endParaRPr lang="es-ES"/>
@@ -1867,7 +1878,8 @@
           <a:p>
             <a:fld id="{EE617D16-BEAA-46D6-AA45-927CEE853205}" type="datetimeFigureOut">
               <a:rPr lang="es-ES" smtClean="0"/>
-              <a:t>04/04/2024</a:t>
+              <a:pPr/>
+              <a:t>06/04/2024</a:t>
             </a:fld>
             <a:endParaRPr lang="es-ES"/>
           </a:p>
@@ -1909,6 +1921,7 @@
           <a:p>
             <a:fld id="{74D9C49B-0C95-4A37-A3B8-0BC88147E74A}" type="slidenum">
               <a:rPr lang="es-ES" smtClean="0"/>
+              <a:pPr/>
               <a:t>‹Nº›</a:t>
             </a:fld>
             <a:endParaRPr lang="es-ES"/>
@@ -2099,7 +2112,8 @@
           <a:p>
             <a:fld id="{EE617D16-BEAA-46D6-AA45-927CEE853205}" type="datetimeFigureOut">
               <a:rPr lang="es-ES" smtClean="0"/>
-              <a:t>04/04/2024</a:t>
+              <a:pPr/>
+              <a:t>06/04/2024</a:t>
             </a:fld>
             <a:endParaRPr lang="es-ES"/>
           </a:p>
@@ -2141,6 +2155,7 @@
           <a:p>
             <a:fld id="{74D9C49B-0C95-4A37-A3B8-0BC88147E74A}" type="slidenum">
               <a:rPr lang="es-ES" smtClean="0"/>
+              <a:pPr/>
               <a:t>‹Nº›</a:t>
             </a:fld>
             <a:endParaRPr lang="es-ES"/>
@@ -2239,7 +2254,8 @@
           <a:p>
             <a:fld id="{EE617D16-BEAA-46D6-AA45-927CEE853205}" type="datetimeFigureOut">
               <a:rPr lang="es-ES" smtClean="0"/>
-              <a:t>04/04/2024</a:t>
+              <a:pPr/>
+              <a:t>06/04/2024</a:t>
             </a:fld>
             <a:endParaRPr lang="es-ES"/>
           </a:p>
@@ -2281,6 +2297,7 @@
           <a:p>
             <a:fld id="{74D9C49B-0C95-4A37-A3B8-0BC88147E74A}" type="slidenum">
               <a:rPr lang="es-ES" smtClean="0"/>
+              <a:pPr/>
               <a:t>‹Nº›</a:t>
             </a:fld>
             <a:endParaRPr lang="es-ES"/>
@@ -2516,7 +2533,8 @@
           <a:p>
             <a:fld id="{EE617D16-BEAA-46D6-AA45-927CEE853205}" type="datetimeFigureOut">
               <a:rPr lang="es-ES" smtClean="0"/>
-              <a:t>04/04/2024</a:t>
+              <a:pPr/>
+              <a:t>06/04/2024</a:t>
             </a:fld>
             <a:endParaRPr lang="es-ES"/>
           </a:p>
@@ -2558,6 +2576,7 @@
           <a:p>
             <a:fld id="{74D9C49B-0C95-4A37-A3B8-0BC88147E74A}" type="slidenum">
               <a:rPr lang="es-ES" smtClean="0"/>
+              <a:pPr/>
               <a:t>‹Nº›</a:t>
             </a:fld>
             <a:endParaRPr lang="es-ES"/>
@@ -2923,7 +2942,8 @@
           <a:p>
             <a:fld id="{EE617D16-BEAA-46D6-AA45-927CEE853205}" type="datetimeFigureOut">
               <a:rPr lang="es-ES" smtClean="0"/>
-              <a:t>04/04/2024</a:t>
+              <a:pPr/>
+              <a:t>06/04/2024</a:t>
             </a:fld>
             <a:endParaRPr lang="es-ES"/>
           </a:p>
@@ -2965,6 +2985,7 @@
           <a:p>
             <a:fld id="{74D9C49B-0C95-4A37-A3B8-0BC88147E74A}" type="slidenum">
               <a:rPr lang="es-ES" smtClean="0"/>
+              <a:pPr/>
               <a:t>‹Nº›</a:t>
             </a:fld>
             <a:endParaRPr lang="es-ES"/>
@@ -3261,7 +3282,8 @@
           <a:p>
             <a:fld id="{EE617D16-BEAA-46D6-AA45-927CEE853205}" type="datetimeFigureOut">
               <a:rPr lang="es-ES" smtClean="0"/>
-              <a:t>04/04/2024</a:t>
+              <a:pPr/>
+              <a:t>06/04/2024</a:t>
             </a:fld>
             <a:endParaRPr lang="es-ES"/>
           </a:p>
@@ -3335,6 +3357,7 @@
           <a:p>
             <a:fld id="{74D9C49B-0C95-4A37-A3B8-0BC88147E74A}" type="slidenum">
               <a:rPr lang="es-ES" smtClean="0"/>
+              <a:pPr/>
               <a:t>‹Nº›</a:t>
             </a:fld>
             <a:endParaRPr lang="es-ES"/>
@@ -4131,15 +4154,7 @@
             </a:pPr>
             <a:r>
               <a:rPr lang="es-ES" sz="2400" dirty="0" smtClean="0"/>
-              <a:t>Principalmente fallecieron </a:t>
-            </a:r>
-            <a:r>
-              <a:rPr lang="es-ES" sz="2400" dirty="0" smtClean="0"/>
-              <a:t>hombres </a:t>
-            </a:r>
-            <a:r>
-              <a:rPr lang="es-ES" sz="2400" dirty="0" smtClean="0"/>
-              <a:t>. La mujer y el niño tuvieron mejor tasa de supervivencia por diversas causas.</a:t>
+              <a:t>Principalmente fallecieron hombres . La mujer y el niño tuvieron mejor tasa de supervivencia por diversas causas.</a:t>
             </a:r>
             <a:endParaRPr lang="es-ES" sz="2400" dirty="0"/>
           </a:p>
@@ -4554,7 +4569,7 @@
       </p:sp>
       <p:pic>
         <p:nvPicPr>
-          <p:cNvPr id="5124" name="Picture 4"/>
+          <p:cNvPr id="2050" name="Picture 2"/>
           <p:cNvPicPr>
             <a:picLocks noChangeAspect="1" noChangeArrowheads="1"/>
           </p:cNvPicPr>
@@ -4562,15 +4577,15 @@
         </p:nvPicPr>
         <p:blipFill>
           <a:blip r:embed="rId2" cstate="print"/>
-          <a:srcRect/>
+          <a:srcRect b="1926"/>
           <a:stretch>
             <a:fillRect/>
           </a:stretch>
         </p:blipFill>
         <p:spPr bwMode="auto">
           <a:xfrm>
-            <a:off x="899592" y="2996952"/>
-            <a:ext cx="7583190" cy="3321225"/>
+            <a:off x="2483768" y="2852936"/>
+            <a:ext cx="4162425" cy="3456384"/>
           </a:xfrm>
           <a:prstGeom prst="rect">
             <a:avLst/>
@@ -4616,38 +4631,6 @@
           <a:chExt cx="0" cy="0"/>
         </a:xfrm>
       </p:grpSpPr>
-      <p:pic>
-        <p:nvPicPr>
-          <p:cNvPr id="7170" name="Picture 2"/>
-          <p:cNvPicPr>
-            <a:picLocks noChangeAspect="1" noChangeArrowheads="1"/>
-          </p:cNvPicPr>
-          <p:nvPr/>
-        </p:nvPicPr>
-        <p:blipFill>
-          <a:blip r:embed="rId2" cstate="print"/>
-          <a:srcRect/>
-          <a:stretch>
-            <a:fillRect/>
-          </a:stretch>
-        </p:blipFill>
-        <p:spPr bwMode="auto">
-          <a:xfrm>
-            <a:off x="179512" y="1988840"/>
-            <a:ext cx="8829675" cy="3810000"/>
-          </a:xfrm>
-          <a:prstGeom prst="rect">
-            <a:avLst/>
-          </a:prstGeom>
-          <a:noFill/>
-          <a:ln w="9525">
-            <a:noFill/>
-            <a:miter lim="800000"/>
-            <a:headEnd/>
-            <a:tailEnd/>
-          </a:ln>
-        </p:spPr>
-      </p:pic>
       <p:sp>
         <p:nvSpPr>
           <p:cNvPr id="5" name="1 Título"/>
@@ -4739,6 +4722,75 @@
           </a:p>
         </p:txBody>
       </p:sp>
+      <p:pic>
+        <p:nvPicPr>
+          <p:cNvPr id="1026" name="Picture 2"/>
+          <p:cNvPicPr>
+            <a:picLocks noChangeAspect="1" noChangeArrowheads="1"/>
+          </p:cNvPicPr>
+          <p:nvPr/>
+        </p:nvPicPr>
+        <p:blipFill>
+          <a:blip r:embed="rId2" cstate="print"/>
+          <a:srcRect b="1660"/>
+          <a:stretch>
+            <a:fillRect/>
+          </a:stretch>
+        </p:blipFill>
+        <p:spPr bwMode="auto">
+          <a:xfrm>
+            <a:off x="2195736" y="2708920"/>
+            <a:ext cx="4171950" cy="3456384"/>
+          </a:xfrm>
+          <a:prstGeom prst="rect">
+            <a:avLst/>
+          </a:prstGeom>
+          <a:noFill/>
+          <a:ln w="9525">
+            <a:noFill/>
+            <a:miter lim="800000"/>
+            <a:headEnd/>
+            <a:tailEnd/>
+          </a:ln>
+        </p:spPr>
+      </p:pic>
+      <p:sp>
+        <p:nvSpPr>
+          <p:cNvPr id="6" name="4 Marcador de contenido"/>
+          <p:cNvSpPr>
+            <a:spLocks noGrp="1"/>
+          </p:cNvSpPr>
+          <p:nvPr>
+            <p:ph sz="quarter" idx="1"/>
+          </p:nvPr>
+        </p:nvSpPr>
+        <p:spPr>
+          <a:xfrm>
+            <a:off x="467544" y="1700808"/>
+            <a:ext cx="8136904" cy="1396752"/>
+          </a:xfrm>
+        </p:spPr>
+        <p:txBody>
+          <a:bodyPr>
+            <a:normAutofit/>
+          </a:bodyPr>
+          <a:lstStyle/>
+          <a:p>
+            <a:pPr>
+              <a:buNone/>
+            </a:pPr>
+            <a:r>
+              <a:rPr lang="es-ES" sz="2400" dirty="0" smtClean="0"/>
+              <a:t>	</a:t>
+            </a:r>
+            <a:r>
+              <a:rPr lang="es-ES" sz="2400" dirty="0" smtClean="0"/>
+              <a:t>El puerto Southampton fue el mayoritario y en el que más viajeros de tercera clase fallecieron.</a:t>
+            </a:r>
+            <a:endParaRPr lang="es-ES" sz="2400" dirty="0"/>
+          </a:p>
+        </p:txBody>
+      </p:sp>
     </p:spTree>
   </p:cSld>
   <p:clrMapOvr>
@@ -4751,31 +4803,6 @@
       </p:par>
     </p:tnLst>
   </p:timing>
-</p:sld>
-</file>
-
-<file path=ppt/slides/slide8.xml><?xml version="1.0" encoding="utf-8"?>
-<p:sld xmlns:a="http://schemas.openxmlformats.org/drawingml/2006/main" xmlns:r="http://schemas.openxmlformats.org/officeDocument/2006/relationships" xmlns:p="http://schemas.openxmlformats.org/presentationml/2006/main">
-  <p:cSld>
-    <p:spTree>
-      <p:nvGrpSpPr>
-        <p:cNvPr id="1" name=""/>
-        <p:cNvGrpSpPr/>
-        <p:nvPr/>
-      </p:nvGrpSpPr>
-      <p:grpSpPr>
-        <a:xfrm>
-          <a:off x="0" y="0"/>
-          <a:ext cx="0" cy="0"/>
-          <a:chOff x="0" y="0"/>
-          <a:chExt cx="0" cy="0"/>
-        </a:xfrm>
-      </p:grpSpPr>
-    </p:spTree>
-  </p:cSld>
-  <p:clrMapOvr>
-    <a:masterClrMapping/>
-  </p:clrMapOvr>
 </p:sld>
 </file>
 

</xml_diff>